<commit_message>
hotfix: Minor adjustments to the slides computational complexity
</commit_message>
<xml_diff>
--- a/source/theory/complexity_classes/_static/complexity_classes.pptx
+++ b/source/theory/complexity_classes/_static/complexity_classes.pptx
@@ -9,7 +9,7 @@
   </p:notesMasterIdLst>
   <p:sldIdLst>
     <p:sldId id="262" r:id="rId2"/>
-    <p:sldId id="272" r:id="rId3"/>
+    <p:sldId id="298" r:id="rId3"/>
     <p:sldId id="260" r:id="rId4"/>
     <p:sldId id="275" r:id="rId5"/>
     <p:sldId id="285" r:id="rId6"/>
@@ -7645,7 +7645,7 @@
           <a:p>
             <a:fld id="{84F29782-C61A-CD4C-9376-B0A272778357}" type="datetimeFigureOut">
               <a:rPr lang="en-NO" smtClean="0"/>
-              <a:t>05/11/2023</a:t>
+              <a:t>06/11/2023</a:t>
             </a:fld>
             <a:endParaRPr lang="en-NO"/>
           </a:p>
@@ -13045,8 +13045,8 @@
           <a:chExt cx="0" cy="0"/>
         </a:xfrm>
       </p:grpSpPr>
-      <mc:AlternateContent xmlns:mc="http://schemas.openxmlformats.org/markup-compatibility/2006">
-        <mc:Choice xmlns:a14="http://schemas.microsoft.com/office/drawing/2010/main" Requires="a14">
+      <mc:AlternateContent xmlns:mc="http://schemas.openxmlformats.org/markup-compatibility/2006" xmlns:a14="http://schemas.microsoft.com/office/drawing/2010/main">
+        <mc:Choice Requires="a14">
           <p:sp>
             <p:nvSpPr>
               <p:cNvPr id="2" name="Title 1">
@@ -13179,7 +13179,7 @@
             </p:txBody>
           </p:sp>
         </mc:Choice>
-        <mc:Fallback>
+        <mc:Fallback xmlns="">
           <p:sp>
             <p:nvSpPr>
               <p:cNvPr id="2" name="Title 1">
@@ -15900,8 +15900,8 @@
           </a:fontRef>
         </p:style>
       </p:cxnSp>
-      <mc:AlternateContent xmlns:mc="http://schemas.openxmlformats.org/markup-compatibility/2006">
-        <mc:Choice xmlns:a14="http://schemas.microsoft.com/office/drawing/2010/main" Requires="a14">
+      <mc:AlternateContent xmlns:mc="http://schemas.openxmlformats.org/markup-compatibility/2006" xmlns:a14="http://schemas.microsoft.com/office/drawing/2010/main">
+        <mc:Choice Requires="a14">
           <p:sp>
             <p:nvSpPr>
               <p:cNvPr id="68" name="Oval 67">
@@ -15983,7 +15983,7 @@
             </p:txBody>
           </p:sp>
         </mc:Choice>
-        <mc:Fallback>
+        <mc:Fallback xmlns="">
           <p:sp>
             <p:nvSpPr>
               <p:cNvPr id="68" name="Oval 67">
@@ -16028,8 +16028,8 @@
           </p:sp>
         </mc:Fallback>
       </mc:AlternateContent>
-      <mc:AlternateContent xmlns:mc="http://schemas.openxmlformats.org/markup-compatibility/2006">
-        <mc:Choice xmlns:a14="http://schemas.microsoft.com/office/drawing/2010/main" Requires="a14">
+      <mc:AlternateContent xmlns:mc="http://schemas.openxmlformats.org/markup-compatibility/2006" xmlns:a14="http://schemas.microsoft.com/office/drawing/2010/main">
+        <mc:Choice Requires="a14">
           <p:sp>
             <p:nvSpPr>
               <p:cNvPr id="69" name="Oval 68">
@@ -16111,7 +16111,7 @@
             </p:txBody>
           </p:sp>
         </mc:Choice>
-        <mc:Fallback>
+        <mc:Fallback xmlns="">
           <p:sp>
             <p:nvSpPr>
               <p:cNvPr id="69" name="Oval 68">
@@ -16156,8 +16156,8 @@
           </p:sp>
         </mc:Fallback>
       </mc:AlternateContent>
-      <mc:AlternateContent xmlns:mc="http://schemas.openxmlformats.org/markup-compatibility/2006">
-        <mc:Choice xmlns:a14="http://schemas.microsoft.com/office/drawing/2010/main" Requires="a14">
+      <mc:AlternateContent xmlns:mc="http://schemas.openxmlformats.org/markup-compatibility/2006" xmlns:a14="http://schemas.microsoft.com/office/drawing/2010/main">
+        <mc:Choice Requires="a14">
           <p:sp>
             <p:nvSpPr>
               <p:cNvPr id="70" name="Oval 69">
@@ -16244,7 +16244,7 @@
             </p:txBody>
           </p:sp>
         </mc:Choice>
-        <mc:Fallback>
+        <mc:Fallback xmlns="">
           <p:sp>
             <p:nvSpPr>
               <p:cNvPr id="70" name="Oval 69">
@@ -16849,8 +16849,8 @@
           </a:fontRef>
         </p:style>
       </p:cxnSp>
-      <mc:AlternateContent xmlns:mc="http://schemas.openxmlformats.org/markup-compatibility/2006">
-        <mc:Choice xmlns:a14="http://schemas.microsoft.com/office/drawing/2010/main" Requires="a14">
+      <mc:AlternateContent xmlns:mc="http://schemas.openxmlformats.org/markup-compatibility/2006" xmlns:a14="http://schemas.microsoft.com/office/drawing/2010/main">
+        <mc:Choice Requires="a14">
           <p:sp>
             <p:nvSpPr>
               <p:cNvPr id="97" name="TextBox 96">
@@ -16879,6 +16879,7 @@
               </a:bodyPr>
               <a:lstStyle/>
               <a:p>
+                <a:pPr/>
                 <a14:m>
                   <m:oMathPara xmlns:m="http://schemas.openxmlformats.org/officeDocument/2006/math">
                     <m:oMathParaPr>
@@ -17053,7 +17054,7 @@
             </p:txBody>
           </p:sp>
         </mc:Choice>
-        <mc:Fallback>
+        <mc:Fallback xmlns="">
           <p:sp>
             <p:nvSpPr>
               <p:cNvPr id="97" name="TextBox 96">
@@ -17985,13 +17986,7 @@
           <p:nvPr/>
         </p:nvPicPr>
         <p:blipFill>
-          <a:blip r:embed="rId2">
-            <a:extLst>
-              <a:ext uri="{96DAC541-7B7A-43D3-8B79-37D633B846F1}">
-                <asvg:svgBlip xmlns:asvg="http://schemas.microsoft.com/office/drawing/2016/SVG/main"/>
-              </a:ext>
-            </a:extLst>
-          </a:blip>
+          <a:blip/>
           <a:stretch>
             <a:fillRect/>
           </a:stretch>
@@ -18478,8 +18473,8 @@
           </a:p>
         </p:txBody>
       </p:sp>
-      <mc:AlternateContent xmlns:mc="http://schemas.openxmlformats.org/markup-compatibility/2006">
-        <mc:Choice xmlns:a14="http://schemas.microsoft.com/office/drawing/2010/main" Requires="a14">
+      <mc:AlternateContent xmlns:mc="http://schemas.openxmlformats.org/markup-compatibility/2006" xmlns:a14="http://schemas.microsoft.com/office/drawing/2010/main">
+        <mc:Choice Requires="a14">
           <p:sp>
             <p:nvSpPr>
               <p:cNvPr id="3" name="Content Placeholder 2">
@@ -18592,7 +18587,7 @@
             </p:txBody>
           </p:sp>
         </mc:Choice>
-        <mc:Fallback>
+        <mc:Fallback xmlns="">
           <p:sp>
             <p:nvSpPr>
               <p:cNvPr id="3" name="Content Placeholder 2">
@@ -19908,58 +19903,6 @@
       </p:grpSpPr>
       <p:sp>
         <p:nvSpPr>
-          <p:cNvPr id="3" name="Rounded Rectangle 2">
-            <a:extLst>
-              <a:ext uri="{FF2B5EF4-FFF2-40B4-BE49-F238E27FC236}">
-                <a16:creationId xmlns:a16="http://schemas.microsoft.com/office/drawing/2014/main" id="{BFF02595-8E7F-D445-BB4A-FD3589FB7B1E}"/>
-              </a:ext>
-            </a:extLst>
-          </p:cNvPr>
-          <p:cNvSpPr/>
-          <p:nvPr/>
-        </p:nvSpPr>
-        <p:spPr>
-          <a:xfrm>
-            <a:off x="8666453" y="1603169"/>
-            <a:ext cx="2983241" cy="3087584"/>
-          </a:xfrm>
-          <a:prstGeom prst="roundRect">
-            <a:avLst/>
-          </a:prstGeom>
-          <a:solidFill>
-            <a:schemeClr val="bg2"/>
-          </a:solidFill>
-          <a:ln>
-            <a:noFill/>
-          </a:ln>
-        </p:spPr>
-        <p:style>
-          <a:lnRef idx="2">
-            <a:schemeClr val="accent1">
-              <a:shade val="50000"/>
-            </a:schemeClr>
-          </a:lnRef>
-          <a:fillRef idx="1">
-            <a:schemeClr val="accent1"/>
-          </a:fillRef>
-          <a:effectRef idx="0">
-            <a:schemeClr val="accent1"/>
-          </a:effectRef>
-          <a:fontRef idx="minor">
-            <a:schemeClr val="lt1"/>
-          </a:fontRef>
-        </p:style>
-        <p:txBody>
-          <a:bodyPr rtlCol="0" anchor="ctr"/>
-          <a:lstStyle/>
-          <a:p>
-            <a:pPr algn="ctr"/>
-            <a:endParaRPr lang="en-NO"/>
-          </a:p>
-        </p:txBody>
-      </p:sp>
-      <p:sp>
-        <p:nvSpPr>
           <p:cNvPr id="2" name="Title 1">
             <a:extLst>
               <a:ext uri="{FF2B5EF4-FFF2-40B4-BE49-F238E27FC236}">
@@ -19983,7 +19926,7 @@
           <a:p>
             <a:r>
               <a:rPr lang="en-NO" dirty="0"/>
-              <a:t>Correctness and Efficiency</a:t>
+              <a:t>Remember…</a:t>
             </a:r>
           </a:p>
         </p:txBody>
@@ -20035,7 +19978,7 @@
           <a:blip r:embed="rId2">
             <a:extLst>
               <a:ext uri="{96DAC541-7B7A-43D3-8B79-37D633B846F1}">
-                <asvg:svgBlip xmlns:asvg="http://schemas.microsoft.com/office/drawing/2016/SVG/main"/>
+                <asvg:svgBlip xmlns:asvg="http://schemas.microsoft.com/office/drawing/2016/SVG/main" r:embed="rId3"/>
               </a:ext>
             </a:extLst>
           </a:blip>
@@ -20071,7 +20014,7 @@
           <a:blip r:embed="rId2">
             <a:extLst>
               <a:ext uri="{96DAC541-7B7A-43D3-8B79-37D633B846F1}">
-                <asvg:svgBlip xmlns:asvg="http://schemas.microsoft.com/office/drawing/2016/SVG/main"/>
+                <asvg:svgBlip xmlns:asvg="http://schemas.microsoft.com/office/drawing/2016/SVG/main" r:embed="rId3"/>
               </a:ext>
             </a:extLst>
           </a:blip>
@@ -20232,7 +20175,6 @@
           <p:cNvCxnSpPr>
             <a:cxnSpLocks/>
             <a:stCxn id="63" idx="3"/>
-            <a:endCxn id="115" idx="1"/>
           </p:cNvCxnSpPr>
           <p:nvPr/>
         </p:nvCxnSpPr>
@@ -20493,7 +20435,7 @@
         </p:nvSpPr>
         <p:spPr>
           <a:xfrm>
-            <a:off x="9376651" y="1729158"/>
+            <a:off x="9503163" y="1726731"/>
             <a:ext cx="1471878" cy="400110"/>
           </a:xfrm>
           <a:prstGeom prst="rect">
@@ -20631,10 +20573,10 @@
           <p:nvPr/>
         </p:nvPicPr>
         <p:blipFill>
-          <a:blip>
+          <a:blip r:embed="rId4">
             <a:extLst>
               <a:ext uri="{837473B0-CC2E-450A-ABE3-18F120FF3D39}">
-                <a1611:picAttrSrcUrl xmlns:a1611="http://schemas.microsoft.com/office/drawing/2016/11/main" r:id="rId2"/>
+                <a1611:picAttrSrcUrl xmlns:a1611="http://schemas.microsoft.com/office/drawing/2016/11/main" r:id="rId5"/>
               </a:ext>
             </a:extLst>
           </a:blip>
@@ -20667,10 +20609,10 @@
           <p:nvPr/>
         </p:nvPicPr>
         <p:blipFill>
-          <a:blip>
+          <a:blip r:embed="rId6">
             <a:extLst>
               <a:ext uri="{837473B0-CC2E-450A-ABE3-18F120FF3D39}">
-                <a1611:picAttrSrcUrl xmlns:a1611="http://schemas.microsoft.com/office/drawing/2016/11/main" r:id="rId3"/>
+                <a1611:picAttrSrcUrl xmlns:a1611="http://schemas.microsoft.com/office/drawing/2016/11/main" r:id="rId7"/>
               </a:ext>
             </a:extLst>
           </a:blip>
@@ -20703,10 +20645,10 @@
           <p:nvPr/>
         </p:nvPicPr>
         <p:blipFill>
-          <a:blip>
+          <a:blip r:embed="rId8">
             <a:extLst>
               <a:ext uri="{837473B0-CC2E-450A-ABE3-18F120FF3D39}">
-                <a1611:picAttrSrcUrl xmlns:a1611="http://schemas.microsoft.com/office/drawing/2016/11/main" r:id="rId4"/>
+                <a1611:picAttrSrcUrl xmlns:a1611="http://schemas.microsoft.com/office/drawing/2016/11/main" r:id="rId9"/>
               </a:ext>
             </a:extLst>
           </a:blip>
@@ -20724,40 +20666,165 @@
           </a:prstGeom>
         </p:spPr>
       </p:pic>
-      <p:pic>
-        <p:nvPicPr>
-          <p:cNvPr id="115" name="Picture 114">
-            <a:extLst>
-              <a:ext uri="{FF2B5EF4-FFF2-40B4-BE49-F238E27FC236}">
-                <a16:creationId xmlns:a16="http://schemas.microsoft.com/office/drawing/2014/main" id="{A9837FB4-A8BA-FD49-8ACA-AE5C349FF1FC}"/>
-              </a:ext>
-            </a:extLst>
-          </p:cNvPr>
-          <p:cNvPicPr>
-            <a:picLocks noChangeAspect="1"/>
-          </p:cNvPicPr>
-          <p:nvPr/>
-        </p:nvPicPr>
-        <p:blipFill>
-          <a:blip/>
-          <a:stretch>
-            <a:fillRect/>
-          </a:stretch>
-        </p:blipFill>
-        <p:spPr>
-          <a:xfrm>
-            <a:off x="8966544" y="3627659"/>
-            <a:ext cx="2292092" cy="470599"/>
-          </a:xfrm>
-          <a:prstGeom prst="rect">
-            <a:avLst/>
-          </a:prstGeom>
-        </p:spPr>
-      </p:pic>
+      <mc:AlternateContent xmlns:mc="http://schemas.openxmlformats.org/markup-compatibility/2006" xmlns:a14="http://schemas.microsoft.com/office/drawing/2010/main">
+        <mc:Choice Requires="a14">
+          <p:sp>
+            <p:nvSpPr>
+              <p:cNvPr id="3" name="TextBox 2">
+                <a:extLst>
+                  <a:ext uri="{FF2B5EF4-FFF2-40B4-BE49-F238E27FC236}">
+                    <a16:creationId xmlns:a16="http://schemas.microsoft.com/office/drawing/2014/main" id="{C25909F4-80DC-EA2B-5DB3-984DDABD4D74}"/>
+                  </a:ext>
+                </a:extLst>
+              </p:cNvPr>
+              <p:cNvSpPr txBox="1"/>
+              <p:nvPr/>
+            </p:nvSpPr>
+            <p:spPr>
+              <a:xfrm>
+                <a:off x="8966544" y="3553760"/>
+                <a:ext cx="2802498" cy="523220"/>
+              </a:xfrm>
+              <a:prstGeom prst="rect">
+                <a:avLst/>
+              </a:prstGeom>
+              <a:noFill/>
+            </p:spPr>
+            <p:txBody>
+              <a:bodyPr wrap="none" rtlCol="0">
+                <a:spAutoFit/>
+              </a:bodyPr>
+              <a:lstStyle/>
+              <a:p>
+                <a:pPr/>
+                <a14:m>
+                  <m:oMathPara xmlns:m="http://schemas.openxmlformats.org/officeDocument/2006/math">
+                    <m:oMathParaPr>
+                      <m:jc m:val="centerGroup"/>
+                    </m:oMathParaPr>
+                    <m:oMath xmlns:m="http://schemas.openxmlformats.org/officeDocument/2006/math">
+                      <m:r>
+                        <a:rPr lang="nb-NO" sz="2800" b="0" i="1" smtClean="0">
+                          <a:latin typeface="Cambria Math" panose="02040503050406030204" pitchFamily="18" charset="0"/>
+                        </a:rPr>
+                        <m:t>𝑓</m:t>
+                      </m:r>
+                      <m:d>
+                        <m:dPr>
+                          <m:ctrlPr>
+                            <a:rPr lang="nb-NO" sz="2800" b="0" i="1" smtClean="0">
+                              <a:latin typeface="Cambria Math" panose="02040503050406030204" pitchFamily="18" charset="0"/>
+                            </a:rPr>
+                          </m:ctrlPr>
+                        </m:dPr>
+                        <m:e>
+                          <m:r>
+                            <a:rPr lang="nb-NO" sz="2800" b="0" i="1" smtClean="0">
+                              <a:latin typeface="Cambria Math" panose="02040503050406030204" pitchFamily="18" charset="0"/>
+                            </a:rPr>
+                            <m:t>𝑥</m:t>
+                          </m:r>
+                          <m:r>
+                            <a:rPr lang="nb-NO" sz="2800" b="0" i="1" smtClean="0">
+                              <a:latin typeface="Cambria Math" panose="02040503050406030204" pitchFamily="18" charset="0"/>
+                            </a:rPr>
+                            <m:t>,</m:t>
+                          </m:r>
+                          <m:r>
+                            <a:rPr lang="nb-NO" sz="2800" b="0" i="1" smtClean="0">
+                              <a:latin typeface="Cambria Math" panose="02040503050406030204" pitchFamily="18" charset="0"/>
+                            </a:rPr>
+                            <m:t>𝑦</m:t>
+                          </m:r>
+                        </m:e>
+                      </m:d>
+                      <m:r>
+                        <a:rPr lang="nb-NO" sz="2800" b="0" i="1" smtClean="0">
+                          <a:latin typeface="Cambria Math" panose="02040503050406030204" pitchFamily="18" charset="0"/>
+                        </a:rPr>
+                        <m:t>= </m:t>
+                      </m:r>
+                      <m:r>
+                        <a:rPr lang="nb-NO" sz="2800" b="0" i="1" smtClean="0">
+                          <a:latin typeface="Cambria Math" panose="02040503050406030204" pitchFamily="18" charset="0"/>
+                        </a:rPr>
+                        <m:t>𝑥</m:t>
+                      </m:r>
+                      <m:r>
+                        <a:rPr lang="nb-NO" sz="2800" b="0" i="1" smtClean="0">
+                          <a:latin typeface="Cambria Math" panose="02040503050406030204" pitchFamily="18" charset="0"/>
+                        </a:rPr>
+                        <m:t> ∗</m:t>
+                      </m:r>
+                      <m:r>
+                        <a:rPr lang="nb-NO" sz="2800" b="0" i="1" smtClean="0">
+                          <a:latin typeface="Cambria Math" panose="02040503050406030204" pitchFamily="18" charset="0"/>
+                        </a:rPr>
+                        <m:t>𝑦</m:t>
+                      </m:r>
+                      <m:r>
+                        <a:rPr lang="nb-NO" sz="2800" b="0" i="1" smtClean="0">
+                          <a:latin typeface="Cambria Math" panose="02040503050406030204" pitchFamily="18" charset="0"/>
+                        </a:rPr>
+                        <m:t> </m:t>
+                      </m:r>
+                    </m:oMath>
+                  </m:oMathPara>
+                </a14:m>
+                <a:endParaRPr lang="en-NO" sz="2800" dirty="0"/>
+              </a:p>
+            </p:txBody>
+          </p:sp>
+        </mc:Choice>
+        <mc:Fallback xmlns="">
+          <p:sp>
+            <p:nvSpPr>
+              <p:cNvPr id="3" name="TextBox 2">
+                <a:extLst>
+                  <a:ext uri="{FF2B5EF4-FFF2-40B4-BE49-F238E27FC236}">
+                    <a16:creationId xmlns:a16="http://schemas.microsoft.com/office/drawing/2014/main" id="{C25909F4-80DC-EA2B-5DB3-984DDABD4D74}"/>
+                  </a:ext>
+                </a:extLst>
+              </p:cNvPr>
+              <p:cNvSpPr txBox="1">
+                <a:spLocks noRot="1" noChangeAspect="1" noMove="1" noResize="1" noEditPoints="1" noAdjustHandles="1" noChangeArrowheads="1" noChangeShapeType="1" noTextEdit="1"/>
+              </p:cNvSpPr>
+              <p:nvPr/>
+            </p:nvSpPr>
+            <p:spPr>
+              <a:xfrm>
+                <a:off x="8966544" y="3553760"/>
+                <a:ext cx="2802498" cy="523220"/>
+              </a:xfrm>
+              <a:prstGeom prst="rect">
+                <a:avLst/>
+              </a:prstGeom>
+              <a:blipFill>
+                <a:blip r:embed="rId10"/>
+                <a:stretch>
+                  <a:fillRect r="-452" b="-20930"/>
+                </a:stretch>
+              </a:blipFill>
+            </p:spPr>
+            <p:txBody>
+              <a:bodyPr/>
+              <a:lstStyle/>
+              <a:p>
+                <a:r>
+                  <a:rPr lang="en-NO">
+                    <a:noFill/>
+                  </a:rPr>
+                  <a:t> </a:t>
+                </a:r>
+              </a:p>
+            </p:txBody>
+          </p:sp>
+        </mc:Fallback>
+      </mc:AlternateContent>
     </p:spTree>
     <p:extLst>
       <p:ext uri="{BB962C8B-B14F-4D97-AF65-F5344CB8AC3E}">
-        <p14:creationId xmlns:p14="http://schemas.microsoft.com/office/powerpoint/2010/main" val="3160526023"/>
+        <p14:creationId xmlns:p14="http://schemas.microsoft.com/office/powerpoint/2010/main" val="3186512321"/>
       </p:ext>
     </p:extLst>
   </p:cSld>
@@ -20798,7 +20865,7 @@
                                           </p:stCondLst>
                                         </p:cTn>
                                         <p:tgtEl>
-                                          <p:spTgt spid="3"/>
+                                          <p:spTgt spid="104"/>
                                         </p:tgtEl>
                                         <p:attrNameLst>
                                           <p:attrName>style.visibility</p:attrName>
@@ -20806,6 +20873,134 @@
                                       </p:cBhvr>
                                       <p:to>
                                         <p:strVal val="visible"/>
+                                      </p:to>
+                                    </p:set>
+                                  </p:childTnLst>
+                                </p:cTn>
+                              </p:par>
+                            </p:childTnLst>
+                          </p:cTn>
+                        </p:par>
+                      </p:childTnLst>
+                    </p:cTn>
+                  </p:par>
+                  <p:par>
+                    <p:cTn id="7" fill="hold">
+                      <p:stCondLst>
+                        <p:cond delay="indefinite"/>
+                      </p:stCondLst>
+                      <p:childTnLst>
+                        <p:par>
+                          <p:cTn id="8" fill="hold">
+                            <p:stCondLst>
+                              <p:cond delay="0"/>
+                            </p:stCondLst>
+                            <p:childTnLst>
+                              <p:par>
+                                <p:cTn id="9" presetID="1" presetClass="entr" presetSubtype="0" fill="hold" grpId="0" nodeType="clickEffect">
+                                  <p:stCondLst>
+                                    <p:cond delay="0"/>
+                                  </p:stCondLst>
+                                  <p:childTnLst>
+                                    <p:set>
+                                      <p:cBhvr>
+                                        <p:cTn id="10" dur="1" fill="hold">
+                                          <p:stCondLst>
+                                            <p:cond delay="0"/>
+                                          </p:stCondLst>
+                                        </p:cTn>
+                                        <p:tgtEl>
+                                          <p:spTgt spid="99"/>
+                                        </p:tgtEl>
+                                        <p:attrNameLst>
+                                          <p:attrName>style.visibility</p:attrName>
+                                        </p:attrNameLst>
+                                      </p:cBhvr>
+                                      <p:to>
+                                        <p:strVal val="visible"/>
+                                      </p:to>
+                                    </p:set>
+                                  </p:childTnLst>
+                                </p:cTn>
+                              </p:par>
+                            </p:childTnLst>
+                          </p:cTn>
+                        </p:par>
+                      </p:childTnLst>
+                    </p:cTn>
+                  </p:par>
+                  <p:par>
+                    <p:cTn id="11" fill="hold">
+                      <p:stCondLst>
+                        <p:cond delay="indefinite"/>
+                      </p:stCondLst>
+                      <p:childTnLst>
+                        <p:par>
+                          <p:cTn id="12" fill="hold">
+                            <p:stCondLst>
+                              <p:cond delay="0"/>
+                            </p:stCondLst>
+                            <p:childTnLst>
+                              <p:par>
+                                <p:cTn id="13" presetID="22" presetClass="emph" presetSubtype="0" fill="hold" nodeType="clickEffect">
+                                  <p:stCondLst>
+                                    <p:cond delay="0"/>
+                                  </p:stCondLst>
+                                  <p:childTnLst>
+                                    <p:animClr clrSpc="hsl" dir="cw">
+                                      <p:cBhvr override="childStyle">
+                                        <p:cTn id="14" dur="500" fill="hold"/>
+                                        <p:tgtEl>
+                                          <p:spTgt spid="104"/>
+                                        </p:tgtEl>
+                                        <p:attrNameLst>
+                                          <p:attrName>style.color</p:attrName>
+                                        </p:attrNameLst>
+                                      </p:cBhvr>
+                                      <p:by>
+                                        <p:hsl h="-7200000" s="0" l="0"/>
+                                      </p:by>
+                                    </p:animClr>
+                                    <p:animClr clrSpc="hsl" dir="cw">
+                                      <p:cBhvr>
+                                        <p:cTn id="15" dur="500" fill="hold"/>
+                                        <p:tgtEl>
+                                          <p:spTgt spid="104"/>
+                                        </p:tgtEl>
+                                        <p:attrNameLst>
+                                          <p:attrName>fillcolor</p:attrName>
+                                        </p:attrNameLst>
+                                      </p:cBhvr>
+                                      <p:by>
+                                        <p:hsl h="-7200000" s="0" l="0"/>
+                                      </p:by>
+                                    </p:animClr>
+                                    <p:animClr clrSpc="hsl" dir="cw">
+                                      <p:cBhvr>
+                                        <p:cTn id="16" dur="500" fill="hold"/>
+                                        <p:tgtEl>
+                                          <p:spTgt spid="104"/>
+                                        </p:tgtEl>
+                                        <p:attrNameLst>
+                                          <p:attrName>stroke.color</p:attrName>
+                                        </p:attrNameLst>
+                                      </p:cBhvr>
+                                      <p:by>
+                                        <p:hsl h="-7200000" s="0" l="0"/>
+                                      </p:by>
+                                    </p:animClr>
+                                    <p:set>
+                                      <p:cBhvr>
+                                        <p:cTn id="17" dur="500" fill="hold"/>
+                                        <p:tgtEl>
+                                          <p:spTgt spid="104"/>
+                                        </p:tgtEl>
+                                        <p:attrNameLst>
+                                          <p:attrName>fill.type</p:attrName>
+                                        </p:attrNameLst>
+                                      </p:cBhvr>
+                                      <p:to>
+                                        <p:strVal val="solid"/>
                                       </p:to>
                                     </p:set>
                                   </p:childTnLst>
@@ -20839,7 +21034,8 @@
       </p:par>
     </p:tnLst>
     <p:bldLst>
-      <p:bldP spid="3" grpId="0" animBg="1"/>
+      <p:bldP spid="99" grpId="0" animBg="1"/>
+      <p:bldP spid="104" grpId="0" animBg="1"/>
     </p:bldLst>
   </p:timing>
 </p:sld>
@@ -23516,13 +23712,7 @@
           <p:nvPr/>
         </p:nvPicPr>
         <p:blipFill>
-          <a:blip r:embed="rId4">
-            <a:extLst>
-              <a:ext uri="{96DAC541-7B7A-43D3-8B79-37D633B846F1}">
-                <asvg:svgBlip xmlns:asvg="http://schemas.microsoft.com/office/drawing/2016/SVG/main"/>
-              </a:ext>
-            </a:extLst>
-          </a:blip>
+          <a:blip/>
           <a:stretch>
             <a:fillRect/>
           </a:stretch>
@@ -26187,8 +26377,8 @@
           </a:p>
         </p:txBody>
       </p:sp>
-      <mc:AlternateContent xmlns:mc="http://schemas.openxmlformats.org/markup-compatibility/2006">
-        <mc:Choice xmlns:a14="http://schemas.microsoft.com/office/drawing/2010/main" Requires="a14">
+      <mc:AlternateContent xmlns:mc="http://schemas.openxmlformats.org/markup-compatibility/2006" xmlns:a14="http://schemas.microsoft.com/office/drawing/2010/main">
+        <mc:Choice Requires="a14">
           <p:sp>
             <p:nvSpPr>
               <p:cNvPr id="7" name="Content Placeholder 2">
@@ -26458,7 +26648,7 @@
             </p:txBody>
           </p:sp>
         </mc:Choice>
-        <mc:Fallback>
+        <mc:Fallback xmlns="">
           <p:sp>
             <p:nvSpPr>
               <p:cNvPr id="7" name="Content Placeholder 2">

</xml_diff>